<commit_message>
Deploying to gh-pages from  @ e76a2876cf8976e9c640d482b7e3658d5a744c7c 🚀
</commit_message>
<xml_diff>
--- a/GovernanceCrisis/presentation.pptx
+++ b/GovernanceCrisis/presentation.pptx
@@ -3438,7 +3438,7 @@
             <a:pPr lvl="1"/>
             <a:r>
               <a:rPr/>
-              <a:t>9/9/2019 President Fritz release a new draft on “collegial” governance, and referendum to be held 9/27-10/1</a:t>
+              <a:t>9/9/2019 President Fritz releases a new draft on “collegial” governance, and referendum to be held 9/27-10/1. Feed back limited to 8 days.</a:t>
             </a:r>
           </a:p>
           <a:p>
@@ -3935,7 +3935,15 @@
             </a:pPr>
             <a:r>
               <a:rPr sz="2000"/>
-              <a:t>The membership of the Executive Committee shall be **taken8* from the College Senate membership, one member from each academic division/school, provost, chief of staff, one member from the Higher Education Officer series, and the President who serves as chair.</a:t>
+              <a:t>The membership of the Executive Committee shall be </a:t>
+            </a:r>
+            <a:r>
+              <a:rPr sz="2000" b="1"/>
+              <a:t>taken</a:t>
+            </a:r>
+            <a:r>
+              <a:rPr sz="2000"/>
+              <a:t> from the College Senate membership, one member from each academic division/school, provost, chief of staff, one member from the Higher Education Officer series, and the President who serves as chair.</a:t>
             </a:r>
           </a:p>
         </p:txBody>
@@ -3982,7 +3990,7 @@
             </a:pPr>
             <a:r>
               <a:rPr/>
-              <a:t>Note the original selection process .. the word used is “taken”, not elected. This was modified, relaxing the faculty membership to be more democratic. but pay attention – it doesn’t say who actually votes! (There is a “from” and a “by” typically.)</a:t>
+              <a:t>Note the original selection process … the word used is “taken,” not elected. This was modified, relaxing the faculty membership to be more democratic. but pay attention – it doesn’t say who actually votes! (There is a “from” and a “by” typically.)</a:t>
             </a:r>
           </a:p>
         </p:txBody>
@@ -4499,11 +4507,15 @@
             </a:pPr>
             <a:r>
               <a:rPr/>
-              <a:t>The latter allows a </a:t>
+              <a:t>The latter allows a proposal submitted by the president with a </a:t>
             </a:r>
             <a:r>
               <a:rPr i="1"/>
-              <a:t>negative proposal to be submitted by the president</a:t>
+              <a:t>negative recommendation</a:t>
+            </a:r>
+            <a:r>
+              <a:rPr/>
+              <a:t> to be submitted by the president to the Board.</a:t>
             </a:r>
           </a:p>
         </p:txBody>
@@ -5151,7 +5163,7 @@
               <a:t>3/3/2021 President Fritz writes “proposing a new and </a:t>
             </a:r>
             <a:r>
-              <a:rPr i="1"/>
+              <a:rPr b="1"/>
               <a:t>more refined</a:t>
             </a:r>
             <a:r>

</xml_diff>

<commit_message>
Deploying to gh-pages from  @ ec36c2a4796849cfea72afbfd40f772bab8e51f8 🚀
</commit_message>
<xml_diff>
--- a/GovernanceCrisis/presentation.pptx
+++ b/GovernanceCrisis/presentation.pptx
@@ -28,6 +28,9 @@
     <p:sldId id="276" r:id="rId22"/>
     <p:sldId id="277" r:id="rId23"/>
     <p:sldId id="278" r:id="rId24"/>
+    <p:sldId id="279" r:id="rId25"/>
+    <p:sldId id="280" r:id="rId26"/>
+    <p:sldId id="281" r:id="rId27"/>
   </p:sldIdLst>
   <p:sldSz cx="9144000" cy="6858000" type="screen4x3"/>
   <p:notesSz cx="6858000" cy="9144000"/>
@@ -3528,65 +3531,31 @@
           <a:bodyPr/>
           <a:lstStyle/>
           <a:p>
-            <a:pPr lvl="1"/>
-            <a:r>
-              <a:rPr/>
-              <a:t>electronic voting will be open from Monday, 9/27 through Friday, 10/1</a:t>
-            </a:r>
-          </a:p>
-          <a:p>
-            <a:pPr lvl="1"/>
-            <a:r>
-              <a:rPr/>
-              <a:t>The </a:t>
+            <a:pPr lvl="0" marL="0" indent="0">
+              <a:buNone/>
+            </a:pPr>
+            <a:r>
+              <a:rPr/>
+              <a:t>The voting on the plan will be by secret electronic ballot created by Institutional Research.</a:t>
+            </a:r>
+          </a:p>
+          <a:p>
+            <a:pPr lvl="0" marL="0" indent="0">
+              <a:buNone/>
+            </a:pPr>
+            <a:r>
+              <a:rPr/>
+              <a:t>All </a:t>
             </a:r>
             <a:r>
               <a:rPr>
                 <a:hlinkClick r:id="rId2"/>
               </a:rPr>
-              <a:t>Instructional Staff</a:t>
-            </a:r>
-            <a:r>
-              <a:rPr/>
-              <a:t> can vote. (This includes Faculty, full-and part-time; and staff (HEO/A, CLT, …)</a:t>
-            </a:r>
-          </a:p>
-          <a:p>
-            <a:pPr lvl="1"/>
-            <a:r>
-              <a:rPr/>
-              <a:t>The president has </a:t>
-            </a:r>
-            <a:r>
-              <a:rPr i="1"/>
-              <a:t>said</a:t>
-            </a:r>
-            <a:r>
-              <a:rPr/>
-              <a:t> but not made official that votes will be secret</a:t>
-            </a:r>
-          </a:p>
-          <a:p>
-            <a:pPr lvl="1"/>
-            <a:r>
-              <a:rPr/>
-              <a:t>The president would not </a:t>
-            </a:r>
-            <a:r>
-              <a:rPr i="1"/>
-              <a:t>verify</a:t>
-            </a:r>
-            <a:r>
-              <a:rPr/>
-              <a:t> that an </a:t>
-            </a:r>
-            <a:r>
-              <a:rPr i="1"/>
-              <a:t>audit</a:t>
-            </a:r>
-            <a:r>
-              <a:rPr/>
-              <a:t> of the vote would be available to determine if 30% participated and of those participating, more than half voted affirmatively.</a:t>
+              <a:t>instructional staff</a:t>
+            </a:r>
+            <a:r>
+              <a:rPr/>
+              <a:t>, as defined in Article 6.1 of the CUNY Bylaws, employed at the College of Staten Island, are eligible to vote.</a:t>
             </a:r>
           </a:p>
         </p:txBody>
@@ -3615,12 +3584,12 @@
       </p:grpSpPr>
       <p:sp>
         <p:nvSpPr>
-          <p:cNvPr id="2" name="Title 1"/>
-          <p:cNvSpPr>
-            <a:spLocks noGrp="1"/>
-          </p:cNvSpPr>
-          <p:nvPr>
-            <p:ph type="title"/>
+          <p:cNvPr id="3" name="Content Placeholder 2"/>
+          <p:cNvSpPr>
+            <a:spLocks noGrp="1"/>
+          </p:cNvSpPr>
+          <p:nvPr>
+            <p:ph idx="1"/>
           </p:nvPr>
         </p:nvSpPr>
         <p:spPr/>
@@ -3633,83 +3602,16 @@
             </a:pPr>
             <a:r>
               <a:rPr/>
-              <a:t>Some</a:t>
-            </a:r>
-            <a:r>
-              <a:rPr/>
-              <a:t> </a:t>
-            </a:r>
-            <a:r>
-              <a:rPr/>
-              <a:t>examples</a:t>
-            </a:r>
-            <a:r>
-              <a:rPr/>
-              <a:t> </a:t>
-            </a:r>
-            <a:r>
-              <a:rPr/>
-              <a:t>of</a:t>
-            </a:r>
-            <a:r>
-              <a:rPr/>
-              <a:t> </a:t>
-            </a:r>
-            <a:r>
-              <a:rPr/>
-              <a:t>changes</a:t>
-            </a:r>
-          </a:p>
-        </p:txBody>
-      </p:sp>
-      <p:sp>
-        <p:nvSpPr>
-          <p:cNvPr id="3" name="Content Placeholder 2"/>
-          <p:cNvSpPr>
-            <a:spLocks noGrp="1"/>
-          </p:cNvSpPr>
-          <p:nvPr>
-            <p:ph idx="1"/>
-          </p:nvPr>
-        </p:nvSpPr>
-        <p:spPr/>
-        <p:txBody>
-          <a:bodyPr/>
-          <a:lstStyle/>
+              <a:t>Institutional Research will send ballots (with a link to vote) to the CSI email address of the eligible voters on September 27. The sender name for said email containing the ballot will appear as “College of Staten Island, survey@csi.cuny.edu.”</a:t>
+            </a:r>
+          </a:p>
           <a:p>
             <a:pPr lvl="0" marL="0" indent="0">
               <a:buNone/>
             </a:pPr>
             <a:r>
               <a:rPr/>
-              <a:t>So what is proposed?</a:t>
-            </a:r>
-          </a:p>
-          <a:p>
-            <a:pPr lvl="0" marL="0" indent="0">
-              <a:buNone/>
-            </a:pPr>
-            <a:r>
-              <a:rPr/>
-              <a:t>Typically changes to governance documents come to the board in redline form. (Basically without exception, save for new plans such as with the SPS)</a:t>
-            </a:r>
-          </a:p>
-          <a:p>
-            <a:pPr lvl="0" marL="1270000" indent="0">
-              <a:buNone/>
-            </a:pPr>
-            <a:r>
-              <a:rPr sz="2000"/>
-              <a:t>Here is a proposed wholesale change.</a:t>
-            </a:r>
-          </a:p>
-          <a:p>
-            <a:pPr lvl="0" marL="0" indent="0">
-              <a:buNone/>
-            </a:pPr>
-            <a:r>
-              <a:rPr/>
-              <a:t>A review of the board approved plan and the initial proposed plan was reviewed at the last town hall. There have been changes, not necessarily improvements:</a:t>
+              <a:t>The link to the electronic ballot will be sent directly to the official CUNY/CSI email address of the employees within the eligible titles.</a:t>
             </a:r>
           </a:p>
         </p:txBody>
@@ -3738,12 +3640,12 @@
       </p:grpSpPr>
       <p:sp>
         <p:nvSpPr>
-          <p:cNvPr id="2" name="Title 1"/>
-          <p:cNvSpPr>
-            <a:spLocks noGrp="1"/>
-          </p:cNvSpPr>
-          <p:nvPr>
-            <p:ph type="title"/>
+          <p:cNvPr id="3" name="Content Placeholder 2"/>
+          <p:cNvSpPr>
+            <a:spLocks noGrp="1"/>
+          </p:cNvSpPr>
+          <p:nvPr>
+            <p:ph idx="1"/>
           </p:nvPr>
         </p:nvSpPr>
         <p:spPr/>
@@ -3756,130 +3658,15 @@
             </a:pPr>
             <a:r>
               <a:rPr/>
-              <a:t>The</a:t>
-            </a:r>
-            <a:r>
-              <a:rPr/>
-              <a:t> </a:t>
-            </a:r>
-            <a:r>
-              <a:rPr/>
-              <a:t>Executive</a:t>
-            </a:r>
-            <a:r>
-              <a:rPr/>
-              <a:t> </a:t>
-            </a:r>
-            <a:r>
-              <a:rPr/>
-              <a:t>Committee</a:t>
-            </a:r>
-            <a:r>
-              <a:rPr/>
-              <a:t> </a:t>
-            </a:r>
-            <a:r>
-              <a:rPr/>
-              <a:t>of</a:t>
-            </a:r>
-            <a:r>
-              <a:rPr/>
-              <a:t> </a:t>
-            </a:r>
-            <a:r>
-              <a:rPr/>
-              <a:t>the</a:t>
-            </a:r>
-            <a:r>
-              <a:rPr/>
-              <a:t> </a:t>
-            </a:r>
-            <a:r>
-              <a:rPr/>
-              <a:t>“</a:t>
-            </a:r>
-            <a:r>
-              <a:rPr/>
-              <a:t>CSI</a:t>
-            </a:r>
-            <a:r>
-              <a:rPr/>
-              <a:t> </a:t>
-            </a:r>
-            <a:r>
-              <a:rPr/>
-              <a:t>College</a:t>
-            </a:r>
-            <a:r>
-              <a:rPr/>
-              <a:t> </a:t>
-            </a:r>
-            <a:r>
-              <a:rPr/>
-              <a:t>Senate</a:t>
-            </a:r>
-            <a:r>
-              <a:rPr/>
-              <a:t>”</a:t>
-            </a:r>
-          </a:p>
-        </p:txBody>
-      </p:sp>
-      <p:sp>
-        <p:nvSpPr>
-          <p:cNvPr id="3" name="Content Placeholder 2"/>
-          <p:cNvSpPr>
-            <a:spLocks noGrp="1"/>
-          </p:cNvSpPr>
-          <p:nvPr>
-            <p:ph idx="1"/>
-          </p:nvPr>
-        </p:nvSpPr>
-        <p:spPr/>
-        <p:txBody>
-          <a:bodyPr/>
-          <a:lstStyle/>
-          <a:p>
-            <a:pPr lvl="0" marL="0" indent="0">
-              <a:buNone/>
-            </a:pPr>
-            <a:r>
-              <a:rPr/>
-              <a:t>Currently this would be the College Council Executive Committee:</a:t>
-            </a:r>
-          </a:p>
-          <a:p>
-            <a:pPr lvl="0" marL="1270000" indent="0">
-              <a:buNone/>
-            </a:pPr>
-            <a:r>
-              <a:rPr sz="2000"/>
-              <a:t>An Executive Committee shall be elected </a:t>
-            </a:r>
-            <a:r>
-              <a:rPr sz="2000" b="1"/>
-              <a:t>by</a:t>
-            </a:r>
-            <a:r>
-              <a:rPr sz="2000"/>
-              <a:t> and </a:t>
-            </a:r>
-            <a:r>
-              <a:rPr sz="2000" b="1"/>
-              <a:t>from</a:t>
-            </a:r>
-            <a:r>
-              <a:rPr sz="2000"/>
-              <a:t> the membership of the Council. Each member is to be elected for a two-year term.</a:t>
-            </a:r>
-          </a:p>
-          <a:p>
-            <a:pPr lvl="0" marL="0" indent="0">
-              <a:buNone/>
-            </a:pPr>
-            <a:r>
-              <a:rPr/>
-              <a:t>Considering the administration is primarily lawyers by training, it is worth looking at their word smithing carefully.</a:t>
+              <a:t>Perez rules do not apply to this process and voting will be </a:t>
+            </a:r>
+            <a:r>
+              <a:rPr b="1"/>
+              <a:t>confidential</a:t>
+            </a:r>
+            <a:r>
+              <a:rPr/>
+              <a:t>. The last day to vote will be October 1, by close of business.</a:t>
             </a:r>
           </a:p>
         </p:txBody>
@@ -3926,24 +3713,23 @@
             </a:pPr>
             <a:r>
               <a:rPr/>
-              <a:t>March 2021:</a:t>
-            </a:r>
-          </a:p>
-          <a:p>
-            <a:pPr lvl="0" marL="1270000" indent="0">
-              <a:buNone/>
-            </a:pPr>
-            <a:r>
-              <a:rPr sz="2000"/>
-              <a:t>The membership of the Executive Committee shall be </a:t>
-            </a:r>
-            <a:r>
-              <a:rPr sz="2000" b="1"/>
-              <a:t>taken</a:t>
-            </a:r>
-            <a:r>
-              <a:rPr sz="2000"/>
-              <a:t> from the College Senate membership, one member from each academic division/school, provost, chief of staff, one member from the Higher Education Officer series, and the President who serves as chair.</a:t>
+              <a:t>The president would not </a:t>
+            </a:r>
+            <a:r>
+              <a:rPr i="1"/>
+              <a:t>verify</a:t>
+            </a:r>
+            <a:r>
+              <a:rPr/>
+              <a:t> to the CC XC last week that an </a:t>
+            </a:r>
+            <a:r>
+              <a:rPr i="1"/>
+              <a:t>audit</a:t>
+            </a:r>
+            <a:r>
+              <a:rPr/>
+              <a:t> of the vote would be available to determine if 30% participated and of those participating, more than half voted affirmatively.</a:t>
             </a:r>
           </a:p>
         </p:txBody>
@@ -3972,6 +3758,55 @@
       </p:grpSpPr>
       <p:sp>
         <p:nvSpPr>
+          <p:cNvPr id="2" name="Title 1"/>
+          <p:cNvSpPr>
+            <a:spLocks noGrp="1"/>
+          </p:cNvSpPr>
+          <p:nvPr>
+            <p:ph type="title"/>
+          </p:nvPr>
+        </p:nvSpPr>
+        <p:spPr/>
+        <p:txBody>
+          <a:bodyPr/>
+          <a:lstStyle/>
+          <a:p>
+            <a:pPr lvl="0" marL="0" indent="0">
+              <a:buNone/>
+            </a:pPr>
+            <a:r>
+              <a:rPr/>
+              <a:t>Some</a:t>
+            </a:r>
+            <a:r>
+              <a:rPr/>
+              <a:t> </a:t>
+            </a:r>
+            <a:r>
+              <a:rPr/>
+              <a:t>examples</a:t>
+            </a:r>
+            <a:r>
+              <a:rPr/>
+              <a:t> </a:t>
+            </a:r>
+            <a:r>
+              <a:rPr/>
+              <a:t>of</a:t>
+            </a:r>
+            <a:r>
+              <a:rPr/>
+              <a:t> </a:t>
+            </a:r>
+            <a:r>
+              <a:rPr/>
+              <a:t>changes</a:t>
+            </a:r>
+          </a:p>
+        </p:txBody>
+      </p:sp>
+      <p:sp>
+        <p:nvSpPr>
           <p:cNvPr id="3" name="Content Placeholder 2"/>
           <p:cNvSpPr>
             <a:spLocks noGrp="1"/>
@@ -3990,7 +3825,34 @@
             </a:pPr>
             <a:r>
               <a:rPr/>
-              <a:t>Note the original selection process … the word used is “taken,” not elected. This was modified, relaxing the faculty membership to be more democratic. but pay attention – it doesn’t say who actually votes! (There is a “from” and a “by” typically.)</a:t>
+              <a:t>So what is proposed?</a:t>
+            </a:r>
+          </a:p>
+          <a:p>
+            <a:pPr lvl="0" marL="0" indent="0">
+              <a:buNone/>
+            </a:pPr>
+            <a:r>
+              <a:rPr/>
+              <a:t>Typically changes to governance documents come to the board in redline form. (Basically without exception, save for new plans such as with the SPS)</a:t>
+            </a:r>
+          </a:p>
+          <a:p>
+            <a:pPr lvl="0" marL="1270000" indent="0">
+              <a:buNone/>
+            </a:pPr>
+            <a:r>
+              <a:rPr sz="2000"/>
+              <a:t>Here is a proposed wholesale change.</a:t>
+            </a:r>
+          </a:p>
+          <a:p>
+            <a:pPr lvl="0" marL="0" indent="0">
+              <a:buNone/>
+            </a:pPr>
+            <a:r>
+              <a:rPr/>
+              <a:t>A review of the board approved plan and the initial proposed plan was reviewed at the last town hall. There have been changes, not necessarily improvements:</a:t>
             </a:r>
           </a:p>
         </p:txBody>
@@ -4019,6 +3881,95 @@
       </p:grpSpPr>
       <p:sp>
         <p:nvSpPr>
+          <p:cNvPr id="2" name="Title 1"/>
+          <p:cNvSpPr>
+            <a:spLocks noGrp="1"/>
+          </p:cNvSpPr>
+          <p:nvPr>
+            <p:ph type="title"/>
+          </p:nvPr>
+        </p:nvSpPr>
+        <p:spPr/>
+        <p:txBody>
+          <a:bodyPr/>
+          <a:lstStyle/>
+          <a:p>
+            <a:pPr lvl="0" marL="0" indent="0">
+              <a:buNone/>
+            </a:pPr>
+            <a:r>
+              <a:rPr/>
+              <a:t>The</a:t>
+            </a:r>
+            <a:r>
+              <a:rPr/>
+              <a:t> </a:t>
+            </a:r>
+            <a:r>
+              <a:rPr/>
+              <a:t>Executive</a:t>
+            </a:r>
+            <a:r>
+              <a:rPr/>
+              <a:t> </a:t>
+            </a:r>
+            <a:r>
+              <a:rPr/>
+              <a:t>Committee</a:t>
+            </a:r>
+            <a:r>
+              <a:rPr/>
+              <a:t> </a:t>
+            </a:r>
+            <a:r>
+              <a:rPr/>
+              <a:t>of</a:t>
+            </a:r>
+            <a:r>
+              <a:rPr/>
+              <a:t> </a:t>
+            </a:r>
+            <a:r>
+              <a:rPr/>
+              <a:t>the</a:t>
+            </a:r>
+            <a:r>
+              <a:rPr/>
+              <a:t> </a:t>
+            </a:r>
+            <a:r>
+              <a:rPr/>
+              <a:t>“</a:t>
+            </a:r>
+            <a:r>
+              <a:rPr/>
+              <a:t>CSI</a:t>
+            </a:r>
+            <a:r>
+              <a:rPr/>
+              <a:t> </a:t>
+            </a:r>
+            <a:r>
+              <a:rPr/>
+              <a:t>College</a:t>
+            </a:r>
+            <a:r>
+              <a:rPr/>
+              <a:t> </a:t>
+            </a:r>
+            <a:r>
+              <a:rPr/>
+              <a:t>Senate</a:t>
+            </a:r>
+            <a:r>
+              <a:rPr/>
+              <a:t>”</a:t>
+            </a:r>
+          </a:p>
+        </p:txBody>
+      </p:sp>
+      <p:sp>
+        <p:nvSpPr>
           <p:cNvPr id="3" name="Content Placeholder 2"/>
           <p:cNvSpPr>
             <a:spLocks noGrp="1"/>
@@ -4037,7 +3988,7 @@
             </a:pPr>
             <a:r>
               <a:rPr/>
-              <a:t>April, 2021:</a:t>
+              <a:t>Currently this would be the College Council Executive Committee:</a:t>
             </a:r>
           </a:p>
           <a:p>
@@ -4046,7 +3997,32 @@
             </a:pPr>
             <a:r>
               <a:rPr sz="2000"/>
-              <a:t>The Executive Committee membership shall consist of members from the College Senate, five faculty and one member from the Higher Education Officer series elected from within the Senate, and ex-officio with vote, the Provost, and the President who serves as chair</a:t>
+              <a:t>An Executive Committee shall be elected </a:t>
+            </a:r>
+            <a:r>
+              <a:rPr sz="2000" b="1"/>
+              <a:t>by</a:t>
+            </a:r>
+            <a:r>
+              <a:rPr sz="2000"/>
+              <a:t> and </a:t>
+            </a:r>
+            <a:r>
+              <a:rPr sz="2000" b="1"/>
+              <a:t>from</a:t>
+            </a:r>
+            <a:r>
+              <a:rPr sz="2000"/>
+              <a:t> the membership of the Council. Each member is to be elected for a two-year term.</a:t>
+            </a:r>
+          </a:p>
+          <a:p>
+            <a:pPr lvl="0" marL="0" indent="0">
+              <a:buNone/>
+            </a:pPr>
+            <a:r>
+              <a:rPr/>
+              <a:t>Considering the administration is primarily lawyers by training, it is worth looking at their word smithing carefully.</a:t>
             </a:r>
           </a:p>
         </p:txBody>
@@ -4093,7 +4069,24 @@
             </a:pPr>
             <a:r>
               <a:rPr/>
-              <a:t>Finally, this was modified to return to an over-representation of the school faculty (3/5ths of the voice representing 1/3 of the faculty) and a revealing comma which implies only the HEO is elected from the senate (redundantly stated) but not by whom. Faculty representation is left ambiguous as to selection, only that the faculty be members of the senate. The word “taken” not explicit, but in force:</a:t>
+              <a:t>March 2021:</a:t>
+            </a:r>
+          </a:p>
+          <a:p>
+            <a:pPr lvl="0" marL="1270000" indent="0">
+              <a:buNone/>
+            </a:pPr>
+            <a:r>
+              <a:rPr sz="2000"/>
+              <a:t>The membership of the Executive Committee shall be </a:t>
+            </a:r>
+            <a:r>
+              <a:rPr sz="2000" b="1"/>
+              <a:t>taken</a:t>
+            </a:r>
+            <a:r>
+              <a:rPr sz="2000"/>
+              <a:t> from the College Senate membership, one member from each academic division/school, provost, chief of staff, one member from the Higher Education Officer series, and the President who serves as chair.</a:t>
             </a:r>
           </a:p>
         </p:txBody>
@@ -4256,24 +4249,7 @@
             </a:pPr>
             <a:r>
               <a:rPr/>
-              <a:t>September, 2021:</a:t>
-            </a:r>
-          </a:p>
-          <a:p>
-            <a:pPr lvl="0" marL="1270000" indent="0">
-              <a:buNone/>
-            </a:pPr>
-            <a:r>
-              <a:rPr sz="2000"/>
-              <a:t>The Executive Committee membership shall consist of members from the College Senate, one faculty member from each academic division/school</a:t>
-            </a:r>
-            <a:r>
-              <a:rPr sz="2000" b="1"/>
-              <a:t>,</a:t>
-            </a:r>
-            <a:r>
-              <a:rPr sz="2000"/>
-              <a:t> and one member from the Higher Education Officer series elected from within the Senate, and ex-officio with vote, the Provost, and the President who serves as chair.</a:t>
+              <a:t>Note the original selection process … the word used is “taken,” not elected. This was modified, relaxing the faculty membership to be more democratic. but pay attention – it doesn’t say who actually votes! (There is a “from” and a “by” typically.)</a:t>
             </a:r>
           </a:p>
         </p:txBody>
@@ -4302,12 +4278,12 @@
       </p:grpSpPr>
       <p:sp>
         <p:nvSpPr>
-          <p:cNvPr id="2" name="Title 1"/>
-          <p:cNvSpPr>
-            <a:spLocks noGrp="1"/>
-          </p:cNvSpPr>
-          <p:nvPr>
-            <p:ph type="title"/>
+          <p:cNvPr id="3" name="Content Placeholder 2"/>
+          <p:cNvSpPr>
+            <a:spLocks noGrp="1"/>
+          </p:cNvSpPr>
+          <p:nvPr>
+            <p:ph idx="1"/>
           </p:nvPr>
         </p:nvSpPr>
         <p:spPr/>
@@ -4320,49 +4296,16 @@
             </a:pPr>
             <a:r>
               <a:rPr/>
-              <a:t>Amendments</a:t>
-            </a:r>
-          </a:p>
-        </p:txBody>
-      </p:sp>
-      <p:sp>
-        <p:nvSpPr>
-          <p:cNvPr id="3" name="Content Placeholder 2"/>
-          <p:cNvSpPr>
-            <a:spLocks noGrp="1"/>
-          </p:cNvSpPr>
-          <p:nvPr>
-            <p:ph idx="1"/>
-          </p:nvPr>
-        </p:nvSpPr>
-        <p:spPr/>
-        <p:txBody>
-          <a:bodyPr/>
-          <a:lstStyle/>
-          <a:p>
-            <a:pPr lvl="0" marL="0" indent="0">
+              <a:t>April, 2021:</a:t>
+            </a:r>
+          </a:p>
+          <a:p>
+            <a:pPr lvl="0" marL="1270000" indent="0">
               <a:buNone/>
             </a:pPr>
             <a:r>
-              <a:rPr/>
-              <a:t>Current</a:t>
-            </a:r>
-          </a:p>
-          <a:p>
-            <a:pPr lvl="0" marL="1270000" indent="0">
-              <a:buNone/>
-            </a:pPr>
-            <a:r>
               <a:rPr sz="2000"/>
-              <a:t>A proposal to alter any provision of Articles I through III may be initiated by the President or by a two-thirds vote of the College Council. Such proposals shall then be submitted to a referendum of the instructional staff. The proposed amendment is to be deemed adopted if approved by a majority of those voting (provided that at least 30% vote), by the President, </a:t>
-            </a:r>
-            <a:r>
-              <a:rPr sz="2000" b="1"/>
-              <a:t>and</a:t>
-            </a:r>
-            <a:r>
-              <a:rPr sz="2000"/>
-              <a:t> by the Board of Trustees.</a:t>
+              <a:t>The Executive Committee membership shall consist of members from the College Senate, five faculty and one member from the Higher Education Officer series elected from within the Senate, and ex-officio with vote, the Provost, and the President who serves as chair</a:t>
             </a:r>
           </a:p>
         </p:txBody>
@@ -4409,16 +4352,7 @@
             </a:pPr>
             <a:r>
               <a:rPr/>
-              <a:t>March, 2021 and April, 2021:</a:t>
-            </a:r>
-          </a:p>
-          <a:p>
-            <a:pPr lvl="0" marL="1270000" indent="0">
-              <a:buNone/>
-            </a:pPr>
-            <a:r>
-              <a:rPr sz="2000"/>
-              <a:t>A proposal to amend the CSI Plan may be initiated by the President or by a two-thirds vote of the College Senate. Such a proposal shall be submitted to a referendum of the General Assembly. For approval, the referendum will require a majority vote of at least 30 percent of the General Assembly. Such a proposal must be submitted to the President and then to the Board of Trustees.</a:t>
+              <a:t>Finally, this was modified to return to an over-representation of the school faculty (3/5ths of the voice representing 1/3 of the faculty) and a revealing comma which implies only the HEO is elected from the senate (redundantly stated) but not by whom. Faculty representation is left ambiguous as to selection, only that the faculty be members of the senate. The word “taken” not explicit, but in force:</a:t>
             </a:r>
           </a:p>
         </p:txBody>
@@ -4465,6 +4399,215 @@
             </a:pPr>
             <a:r>
               <a:rPr/>
+              <a:t>September, 2021:</a:t>
+            </a:r>
+          </a:p>
+          <a:p>
+            <a:pPr lvl="0" marL="1270000" indent="0">
+              <a:buNone/>
+            </a:pPr>
+            <a:r>
+              <a:rPr sz="2000"/>
+              <a:t>The Executive Committee membership shall consist of members from the College Senate, one faculty member from each academic division/school</a:t>
+            </a:r>
+            <a:r>
+              <a:rPr sz="2000" b="1"/>
+              <a:t>,</a:t>
+            </a:r>
+            <a:r>
+              <a:rPr sz="2000"/>
+              <a:t> and one member from the Higher Education Officer series elected from within the Senate, and ex-officio with vote, the Provost, and the President who serves as chair.</a:t>
+            </a:r>
+          </a:p>
+        </p:txBody>
+      </p:sp>
+    </p:spTree>
+  </p:cSld>
+</p:sld>
+</file>
+
+<file path=ppt/slides/slide24.xml><?xml version="1.0" encoding="utf-8"?>
+<p:sld xmlns:a="http://schemas.openxmlformats.org/drawingml/2006/main" xmlns:r="http://schemas.openxmlformats.org/officeDocument/2006/relationships" xmlns:p="http://schemas.openxmlformats.org/presentationml/2006/main">
+  <p:cSld>
+    <p:spTree>
+      <p:nvGrpSpPr>
+        <p:cNvPr id="1" name=""/>
+        <p:cNvGrpSpPr/>
+        <p:nvPr/>
+      </p:nvGrpSpPr>
+      <p:grpSpPr>
+        <a:xfrm>
+          <a:off x="0" y="0"/>
+          <a:ext cx="0" cy="0"/>
+          <a:chOff x="0" y="0"/>
+          <a:chExt cx="0" cy="0"/>
+        </a:xfrm>
+      </p:grpSpPr>
+      <p:sp>
+        <p:nvSpPr>
+          <p:cNvPr id="2" name="Title 1"/>
+          <p:cNvSpPr>
+            <a:spLocks noGrp="1"/>
+          </p:cNvSpPr>
+          <p:nvPr>
+            <p:ph type="title"/>
+          </p:nvPr>
+        </p:nvSpPr>
+        <p:spPr/>
+        <p:txBody>
+          <a:bodyPr/>
+          <a:lstStyle/>
+          <a:p>
+            <a:pPr lvl="0" marL="0" indent="0">
+              <a:buNone/>
+            </a:pPr>
+            <a:r>
+              <a:rPr/>
+              <a:t>Amendments</a:t>
+            </a:r>
+          </a:p>
+        </p:txBody>
+      </p:sp>
+      <p:sp>
+        <p:nvSpPr>
+          <p:cNvPr id="3" name="Content Placeholder 2"/>
+          <p:cNvSpPr>
+            <a:spLocks noGrp="1"/>
+          </p:cNvSpPr>
+          <p:nvPr>
+            <p:ph idx="1"/>
+          </p:nvPr>
+        </p:nvSpPr>
+        <p:spPr/>
+        <p:txBody>
+          <a:bodyPr/>
+          <a:lstStyle/>
+          <a:p>
+            <a:pPr lvl="0" marL="0" indent="0">
+              <a:buNone/>
+            </a:pPr>
+            <a:r>
+              <a:rPr/>
+              <a:t>Current</a:t>
+            </a:r>
+          </a:p>
+          <a:p>
+            <a:pPr lvl="0" marL="1270000" indent="0">
+              <a:buNone/>
+            </a:pPr>
+            <a:r>
+              <a:rPr sz="2000"/>
+              <a:t>A proposal to alter any provision of Articles I through III may be initiated by the President or by a two-thirds vote of the College Council. Such proposals shall then be submitted to a referendum of the instructional staff. The proposed amendment is to be deemed adopted if approved by a majority of those voting (provided that at least 30% vote), by the President, </a:t>
+            </a:r>
+            <a:r>
+              <a:rPr sz="2000" b="1"/>
+              <a:t>and</a:t>
+            </a:r>
+            <a:r>
+              <a:rPr sz="2000"/>
+              <a:t> by the Board of Trustees.</a:t>
+            </a:r>
+          </a:p>
+        </p:txBody>
+      </p:sp>
+    </p:spTree>
+  </p:cSld>
+</p:sld>
+</file>
+
+<file path=ppt/slides/slide25.xml><?xml version="1.0" encoding="utf-8"?>
+<p:sld xmlns:a="http://schemas.openxmlformats.org/drawingml/2006/main" xmlns:r="http://schemas.openxmlformats.org/officeDocument/2006/relationships" xmlns:p="http://schemas.openxmlformats.org/presentationml/2006/main">
+  <p:cSld>
+    <p:spTree>
+      <p:nvGrpSpPr>
+        <p:cNvPr id="1" name=""/>
+        <p:cNvGrpSpPr/>
+        <p:nvPr/>
+      </p:nvGrpSpPr>
+      <p:grpSpPr>
+        <a:xfrm>
+          <a:off x="0" y="0"/>
+          <a:ext cx="0" cy="0"/>
+          <a:chOff x="0" y="0"/>
+          <a:chExt cx="0" cy="0"/>
+        </a:xfrm>
+      </p:grpSpPr>
+      <p:sp>
+        <p:nvSpPr>
+          <p:cNvPr id="3" name="Content Placeholder 2"/>
+          <p:cNvSpPr>
+            <a:spLocks noGrp="1"/>
+          </p:cNvSpPr>
+          <p:nvPr>
+            <p:ph idx="1"/>
+          </p:nvPr>
+        </p:nvSpPr>
+        <p:spPr/>
+        <p:txBody>
+          <a:bodyPr/>
+          <a:lstStyle/>
+          <a:p>
+            <a:pPr lvl="0" marL="0" indent="0">
+              <a:buNone/>
+            </a:pPr>
+            <a:r>
+              <a:rPr/>
+              <a:t>March, 2021 and April, 2021:</a:t>
+            </a:r>
+          </a:p>
+          <a:p>
+            <a:pPr lvl="0" marL="1270000" indent="0">
+              <a:buNone/>
+            </a:pPr>
+            <a:r>
+              <a:rPr sz="2000"/>
+              <a:t>A proposal to amend the CSI Plan may be initiated by the President or by a two-thirds vote of the College Senate. Such a proposal shall be submitted to a referendum of the General Assembly. For approval, the referendum will require a majority vote of at least 30 percent of the General Assembly. Such a proposal must be submitted to the President and then to the Board of Trustees.</a:t>
+            </a:r>
+          </a:p>
+        </p:txBody>
+      </p:sp>
+    </p:spTree>
+  </p:cSld>
+</p:sld>
+</file>
+
+<file path=ppt/slides/slide26.xml><?xml version="1.0" encoding="utf-8"?>
+<p:sld xmlns:a="http://schemas.openxmlformats.org/drawingml/2006/main" xmlns:r="http://schemas.openxmlformats.org/officeDocument/2006/relationships" xmlns:p="http://schemas.openxmlformats.org/presentationml/2006/main">
+  <p:cSld>
+    <p:spTree>
+      <p:nvGrpSpPr>
+        <p:cNvPr id="1" name=""/>
+        <p:cNvGrpSpPr/>
+        <p:nvPr/>
+      </p:nvGrpSpPr>
+      <p:grpSpPr>
+        <a:xfrm>
+          <a:off x="0" y="0"/>
+          <a:ext cx="0" cy="0"/>
+          <a:chOff x="0" y="0"/>
+          <a:chExt cx="0" cy="0"/>
+        </a:xfrm>
+      </p:grpSpPr>
+      <p:sp>
+        <p:nvSpPr>
+          <p:cNvPr id="3" name="Content Placeholder 2"/>
+          <p:cNvSpPr>
+            <a:spLocks noGrp="1"/>
+          </p:cNvSpPr>
+          <p:nvPr>
+            <p:ph idx="1"/>
+          </p:nvPr>
+        </p:nvSpPr>
+        <p:spPr/>
+        <p:txBody>
+          <a:bodyPr/>
+          <a:lstStyle/>
+          <a:p>
+            <a:pPr lvl="0" marL="0" indent="0">
+              <a:buNone/>
+            </a:pPr>
+            <a:r>
+              <a:rPr/>
               <a:t>September, 2021</a:t>
             </a:r>
           </a:p>
@@ -4515,7 +4658,15 @@
             </a:r>
             <a:r>
               <a:rPr/>
-              <a:t> to be submitted by the president to the Board.</a:t>
+              <a:t> to be submitted by the president to the Board. Effectively </a:t>
+            </a:r>
+            <a:r>
+              <a:rPr i="1"/>
+              <a:t>carte blanche</a:t>
+            </a:r>
+            <a:r>
+              <a:rPr/>
+              <a:t>.</a:t>
             </a:r>
           </a:p>
         </p:txBody>

</xml_diff>